<commit_message>
more topics, fill in later
</commit_message>
<xml_diff>
--- a/slides/3_LLMs.pptx
+++ b/slides/3_LLMs.pptx
@@ -5,7 +5,7 @@
     <p:sldMasterId id="2147483648" r:id="rId1"/>
   </p:sldMasterIdLst>
   <p:notesMasterIdLst>
-    <p:notesMasterId r:id="rId20"/>
+    <p:notesMasterId r:id="rId21"/>
   </p:notesMasterIdLst>
   <p:sldIdLst>
     <p:sldId id="256" r:id="rId2"/>
@@ -14,18 +14,19 @@
     <p:sldId id="696" r:id="rId5"/>
     <p:sldId id="309" r:id="rId6"/>
     <p:sldId id="802" r:id="rId7"/>
-    <p:sldId id="813" r:id="rId8"/>
-    <p:sldId id="285" r:id="rId9"/>
-    <p:sldId id="803" r:id="rId10"/>
-    <p:sldId id="799" r:id="rId11"/>
-    <p:sldId id="807" r:id="rId12"/>
-    <p:sldId id="806" r:id="rId13"/>
-    <p:sldId id="810" r:id="rId14"/>
-    <p:sldId id="797" r:id="rId15"/>
-    <p:sldId id="809" r:id="rId16"/>
-    <p:sldId id="808" r:id="rId17"/>
-    <p:sldId id="804" r:id="rId18"/>
-    <p:sldId id="811" r:id="rId19"/>
+    <p:sldId id="814" r:id="rId8"/>
+    <p:sldId id="813" r:id="rId9"/>
+    <p:sldId id="285" r:id="rId10"/>
+    <p:sldId id="803" r:id="rId11"/>
+    <p:sldId id="799" r:id="rId12"/>
+    <p:sldId id="807" r:id="rId13"/>
+    <p:sldId id="806" r:id="rId14"/>
+    <p:sldId id="810" r:id="rId15"/>
+    <p:sldId id="797" r:id="rId16"/>
+    <p:sldId id="809" r:id="rId17"/>
+    <p:sldId id="808" r:id="rId18"/>
+    <p:sldId id="804" r:id="rId19"/>
+    <p:sldId id="811" r:id="rId20"/>
   </p:sldIdLst>
   <p:sldSz cx="12192000" cy="6858000"/>
   <p:notesSz cx="6858000" cy="9144000"/>
@@ -10803,6 +10804,285 @@
           <p:cNvPr id="2" name="Title 1">
             <a:extLst>
               <a:ext uri="{FF2B5EF4-FFF2-40B4-BE49-F238E27FC236}">
+                <a16:creationId xmlns:a16="http://schemas.microsoft.com/office/drawing/2014/main" id="{F89B18D8-662F-8E62-9266-15406EC258A0}"/>
+              </a:ext>
+            </a:extLst>
+          </p:cNvPr>
+          <p:cNvSpPr>
+            <a:spLocks noGrp="1"/>
+          </p:cNvSpPr>
+          <p:nvPr>
+            <p:ph type="title"/>
+          </p:nvPr>
+        </p:nvSpPr>
+        <p:spPr/>
+        <p:txBody>
+          <a:bodyPr/>
+          <a:lstStyle/>
+          <a:p>
+            <a:r>
+              <a:rPr lang="en-DE" dirty="0"/>
+              <a:t>Size Matters</a:t>
+            </a:r>
+            <a:r>
+              <a:rPr lang="en-GB" dirty="0"/>
+              <a:t>: </a:t>
+            </a:r>
+            <a:r>
+              <a:rPr lang="en-GB" b="1" dirty="0"/>
+              <a:t>LARGE</a:t>
+            </a:r>
+            <a:r>
+              <a:rPr lang="en-GB" dirty="0"/>
+              <a:t> Language Models</a:t>
+            </a:r>
+            <a:endParaRPr lang="en-DE" dirty="0"/>
+          </a:p>
+        </p:txBody>
+      </p:sp>
+      <p:sp>
+        <p:nvSpPr>
+          <p:cNvPr id="3" name="Content Placeholder 2">
+            <a:extLst>
+              <a:ext uri="{FF2B5EF4-FFF2-40B4-BE49-F238E27FC236}">
+                <a16:creationId xmlns:a16="http://schemas.microsoft.com/office/drawing/2014/main" id="{8E0F4078-2FDF-FC34-76CD-ACB22B47969E}"/>
+              </a:ext>
+            </a:extLst>
+          </p:cNvPr>
+          <p:cNvSpPr>
+            <a:spLocks noGrp="1"/>
+          </p:cNvSpPr>
+          <p:nvPr>
+            <p:ph idx="1"/>
+          </p:nvPr>
+        </p:nvSpPr>
+        <p:spPr>
+          <a:xfrm>
+            <a:off x="838198" y="1825625"/>
+            <a:ext cx="8936197" cy="4351338"/>
+          </a:xfrm>
+        </p:spPr>
+        <p:txBody>
+          <a:bodyPr>
+            <a:normAutofit/>
+          </a:bodyPr>
+          <a:lstStyle/>
+          <a:p>
+            <a:pPr marL="0" indent="0">
+              <a:buNone/>
+            </a:pPr>
+            <a:r>
+              <a:rPr lang="en-GB" sz="2600" dirty="0">
+                <a:hlinkClick r:id="rId2"/>
+              </a:rPr>
+              <a:t>scaling laws</a:t>
+            </a:r>
+            <a:r>
+              <a:rPr lang="en-GB" sz="2600" dirty="0"/>
+              <a:t>, </a:t>
+            </a:r>
+            <a:r>
+              <a:rPr lang="en-GB" sz="2600" dirty="0">
+                <a:hlinkClick r:id="rId3"/>
+              </a:rPr>
+              <a:t>Chinchilla</a:t>
+            </a:r>
+            <a:r>
+              <a:rPr lang="en-GB" sz="2600" dirty="0"/>
+              <a:t>: coupled performance power laws with model size, amount of training data, and compute</a:t>
+            </a:r>
+          </a:p>
+          <a:p>
+            <a:pPr marL="0" indent="0">
+              <a:buNone/>
+            </a:pPr>
+            <a:r>
+              <a:rPr lang="en-GB" sz="2600" dirty="0">
+                <a:sym typeface="Wingdings" panose="05000000000000000000" pitchFamily="2" charset="2"/>
+              </a:rPr>
+              <a:t> </a:t>
+            </a:r>
+            <a:r>
+              <a:rPr lang="en-GB" sz="2600" dirty="0"/>
+              <a:t>era of large-scale models</a:t>
+            </a:r>
+          </a:p>
+          <a:p>
+            <a:pPr marL="0" indent="0">
+              <a:buNone/>
+            </a:pPr>
+            <a:endParaRPr lang="en-GB" sz="2600" dirty="0"/>
+          </a:p>
+          <a:p>
+            <a:pPr marL="0" indent="0">
+              <a:buNone/>
+            </a:pPr>
+            <a:r>
+              <a:rPr lang="en-GB" sz="2600" dirty="0"/>
+              <a:t>emergent abilities of LLMs:</a:t>
+            </a:r>
+          </a:p>
+          <a:p>
+            <a:r>
+              <a:rPr lang="en-GB" sz="2600" dirty="0"/>
+              <a:t>multi-task learning: perform new tasks at test time without task-specific training (via </a:t>
+            </a:r>
+            <a:r>
+              <a:rPr lang="en-GB" sz="2600" dirty="0">
+                <a:sym typeface="Wingdings" pitchFamily="2" charset="2"/>
+              </a:rPr>
+              <a:t>p</a:t>
+            </a:r>
+            <a:r>
+              <a:rPr lang="en-GB" sz="2600" dirty="0"/>
+              <a:t>rompting)</a:t>
+            </a:r>
+          </a:p>
+          <a:p>
+            <a:r>
+              <a:rPr lang="en-GB" sz="2600" dirty="0">
+                <a:solidFill>
+                  <a:srgbClr val="212529"/>
+                </a:solidFill>
+              </a:rPr>
+              <a:t>reasoning capabilities</a:t>
+            </a:r>
+            <a:endParaRPr lang="en-GB" sz="2600" dirty="0"/>
+          </a:p>
+        </p:txBody>
+      </p:sp>
+      <p:sp>
+        <p:nvSpPr>
+          <p:cNvPr id="4" name="Slide Number Placeholder 3">
+            <a:extLst>
+              <a:ext uri="{FF2B5EF4-FFF2-40B4-BE49-F238E27FC236}">
+                <a16:creationId xmlns:a16="http://schemas.microsoft.com/office/drawing/2014/main" id="{649F0045-E4C4-0C38-5A9B-7A5BA0214CE7}"/>
+              </a:ext>
+            </a:extLst>
+          </p:cNvPr>
+          <p:cNvSpPr>
+            <a:spLocks noGrp="1"/>
+          </p:cNvSpPr>
+          <p:nvPr>
+            <p:ph type="sldNum" sz="quarter" idx="12"/>
+          </p:nvPr>
+        </p:nvSpPr>
+        <p:spPr/>
+        <p:txBody>
+          <a:bodyPr/>
+          <a:lstStyle/>
+          <a:p>
+            <a:fld id="{849D05A8-43E9-1C49-8606-50AB68220DEC}" type="slidenum">
+              <a:rPr lang="en-DE" smtClean="0"/>
+              <a:t>10</a:t>
+            </a:fld>
+            <a:endParaRPr lang="en-DE"/>
+          </a:p>
+        </p:txBody>
+      </p:sp>
+      <p:pic>
+        <p:nvPicPr>
+          <p:cNvPr id="6" name="Picture 5">
+            <a:extLst>
+              <a:ext uri="{FF2B5EF4-FFF2-40B4-BE49-F238E27FC236}">
+                <a16:creationId xmlns:a16="http://schemas.microsoft.com/office/drawing/2014/main" id="{B671ACDA-58DE-C671-C490-9A25C570A67D}"/>
+              </a:ext>
+            </a:extLst>
+          </p:cNvPr>
+          <p:cNvPicPr>
+            <a:picLocks noChangeAspect="1"/>
+          </p:cNvPicPr>
+          <p:nvPr/>
+        </p:nvPicPr>
+        <p:blipFill>
+          <a:blip r:embed="rId4"/>
+          <a:stretch>
+            <a:fillRect/>
+          </a:stretch>
+        </p:blipFill>
+        <p:spPr>
+          <a:xfrm>
+            <a:off x="9774395" y="1005021"/>
+            <a:ext cx="2390243" cy="5344539"/>
+          </a:xfrm>
+          <a:prstGeom prst="rect">
+            <a:avLst/>
+          </a:prstGeom>
+        </p:spPr>
+      </p:pic>
+      <p:sp>
+        <p:nvSpPr>
+          <p:cNvPr id="7" name="TextBox 6">
+            <a:extLst>
+              <a:ext uri="{FF2B5EF4-FFF2-40B4-BE49-F238E27FC236}">
+                <a16:creationId xmlns:a16="http://schemas.microsoft.com/office/drawing/2014/main" id="{0467208A-C2CD-8126-638D-2517BFC96589}"/>
+              </a:ext>
+            </a:extLst>
+          </p:cNvPr>
+          <p:cNvSpPr txBox="1"/>
+          <p:nvPr/>
+        </p:nvSpPr>
+        <p:spPr>
+          <a:xfrm>
+            <a:off x="11632120" y="6349560"/>
+            <a:ext cx="532518" cy="246221"/>
+          </a:xfrm>
+          <a:prstGeom prst="rect">
+            <a:avLst/>
+          </a:prstGeom>
+          <a:noFill/>
+        </p:spPr>
+        <p:txBody>
+          <a:bodyPr wrap="none" rtlCol="0">
+            <a:spAutoFit/>
+          </a:bodyPr>
+          <a:lstStyle/>
+          <a:p>
+            <a:r>
+              <a:rPr lang="de-DE" sz="1000" dirty="0">
+                <a:hlinkClick r:id="rId5"/>
+              </a:rPr>
+              <a:t>source</a:t>
+            </a:r>
+            <a:endParaRPr lang="de-DE" sz="1000" dirty="0"/>
+          </a:p>
+        </p:txBody>
+      </p:sp>
+    </p:spTree>
+    <p:extLst>
+      <p:ext uri="{BB962C8B-B14F-4D97-AF65-F5344CB8AC3E}">
+        <p14:creationId xmlns:p14="http://schemas.microsoft.com/office/powerpoint/2010/main" val="839114839"/>
+      </p:ext>
+    </p:extLst>
+  </p:cSld>
+  <p:clrMapOvr>
+    <a:masterClrMapping/>
+  </p:clrMapOvr>
+</p:sld>
+</file>
+
+<file path=ppt/slides/slide11.xml><?xml version="1.0" encoding="utf-8"?>
+<p:sld xmlns:a="http://schemas.openxmlformats.org/drawingml/2006/main" xmlns:r="http://schemas.openxmlformats.org/officeDocument/2006/relationships" xmlns:p="http://schemas.openxmlformats.org/presentationml/2006/main">
+  <p:cSld>
+    <p:spTree>
+      <p:nvGrpSpPr>
+        <p:cNvPr id="1" name=""/>
+        <p:cNvGrpSpPr/>
+        <p:nvPr/>
+      </p:nvGrpSpPr>
+      <p:grpSpPr>
+        <a:xfrm>
+          <a:off x="0" y="0"/>
+          <a:ext cx="0" cy="0"/>
+          <a:chOff x="0" y="0"/>
+          <a:chExt cx="0" cy="0"/>
+        </a:xfrm>
+      </p:grpSpPr>
+      <p:sp>
+        <p:nvSpPr>
+          <p:cNvPr id="2" name="Title 1">
+            <a:extLst>
+              <a:ext uri="{FF2B5EF4-FFF2-40B4-BE49-F238E27FC236}">
                 <a16:creationId xmlns:a16="http://schemas.microsoft.com/office/drawing/2014/main" id="{6485C368-8592-0C01-7155-B0402DBC5A37}"/>
               </a:ext>
             </a:extLst>
@@ -10958,7 +11238,7 @@
           <a:p>
             <a:fld id="{849D05A8-43E9-1C49-8606-50AB68220DEC}" type="slidenum">
               <a:rPr lang="en-DE" smtClean="0"/>
-              <a:t>10</a:t>
+              <a:t>11</a:t>
             </a:fld>
             <a:endParaRPr lang="en-DE"/>
           </a:p>
@@ -11176,7 +11456,7 @@
 </p:sld>
 </file>
 
-<file path=ppt/slides/slide11.xml><?xml version="1.0" encoding="utf-8"?>
+<file path=ppt/slides/slide12.xml><?xml version="1.0" encoding="utf-8"?>
 <p:sld xmlns:a="http://schemas.openxmlformats.org/drawingml/2006/main" xmlns:r="http://schemas.openxmlformats.org/officeDocument/2006/relationships" xmlns:p="http://schemas.openxmlformats.org/presentationml/2006/main">
   <p:cSld>
     <p:spTree>
@@ -11216,7 +11496,7 @@
           <a:p>
             <a:fld id="{3D4C94FE-FF23-4504-88E9-14D481113291}" type="slidenum">
               <a:rPr lang="en-GB" smtClean="0"/>
-              <a:t>11</a:t>
+              <a:t>12</a:t>
             </a:fld>
             <a:endParaRPr lang="en-GB"/>
           </a:p>
@@ -11320,7 +11600,7 @@
 </p:sld>
 </file>
 
-<file path=ppt/slides/slide12.xml><?xml version="1.0" encoding="utf-8"?>
+<file path=ppt/slides/slide13.xml><?xml version="1.0" encoding="utf-8"?>
 <p:sld xmlns:a="http://schemas.openxmlformats.org/drawingml/2006/main" xmlns:r="http://schemas.openxmlformats.org/officeDocument/2006/relationships" xmlns:p="http://schemas.openxmlformats.org/presentationml/2006/main">
   <p:cSld>
     <p:spTree>
@@ -11397,7 +11677,7 @@
           <a:p>
             <a:fld id="{3D4C94FE-FF23-4504-88E9-14D481113291}" type="slidenum">
               <a:rPr lang="en-GB" smtClean="0"/>
-              <a:t>12</a:t>
+              <a:t>13</a:t>
             </a:fld>
             <a:endParaRPr lang="en-GB"/>
           </a:p>
@@ -11919,7 +12199,7 @@
 </p:sld>
 </file>
 
-<file path=ppt/slides/slide13.xml><?xml version="1.0" encoding="utf-8"?>
+<file path=ppt/slides/slide14.xml><?xml version="1.0" encoding="utf-8"?>
 <p:sld xmlns:a="http://schemas.openxmlformats.org/drawingml/2006/main" xmlns:r="http://schemas.openxmlformats.org/officeDocument/2006/relationships" xmlns:p="http://schemas.openxmlformats.org/presentationml/2006/main">
   <p:cSld>
     <p:spTree>
@@ -11959,7 +12239,7 @@
           <a:p>
             <a:fld id="{3D4C94FE-FF23-4504-88E9-14D481113291}" type="slidenum">
               <a:rPr lang="en-GB" smtClean="0"/>
-              <a:t>13</a:t>
+              <a:t>14</a:t>
             </a:fld>
             <a:endParaRPr lang="en-GB"/>
           </a:p>
@@ -12166,7 +12446,7 @@
 </p:sld>
 </file>
 
-<file path=ppt/slides/slide14.xml><?xml version="1.0" encoding="utf-8"?>
+<file path=ppt/slides/slide15.xml><?xml version="1.0" encoding="utf-8"?>
 <p:sld xmlns:a="http://schemas.openxmlformats.org/drawingml/2006/main" xmlns:r="http://schemas.openxmlformats.org/officeDocument/2006/relationships" xmlns:p="http://schemas.openxmlformats.org/presentationml/2006/main">
   <p:cSld>
     <p:spTree>
@@ -12206,7 +12486,7 @@
           <a:p>
             <a:fld id="{849D05A8-43E9-1C49-8606-50AB68220DEC}" type="slidenum">
               <a:rPr lang="en-DE" smtClean="0"/>
-              <a:t>14</a:t>
+              <a:t>15</a:t>
             </a:fld>
             <a:endParaRPr lang="en-DE" dirty="0"/>
           </a:p>
@@ -12356,139 +12636,6 @@
     <p:extLst>
       <p:ext uri="{BB962C8B-B14F-4D97-AF65-F5344CB8AC3E}">
         <p14:creationId xmlns:p14="http://schemas.microsoft.com/office/powerpoint/2010/main" val="1984626277"/>
-      </p:ext>
-    </p:extLst>
-  </p:cSld>
-  <p:clrMapOvr>
-    <a:masterClrMapping/>
-  </p:clrMapOvr>
-</p:sld>
-</file>
-
-<file path=ppt/slides/slide15.xml><?xml version="1.0" encoding="utf-8"?>
-<p:sld xmlns:a="http://schemas.openxmlformats.org/drawingml/2006/main" xmlns:r="http://schemas.openxmlformats.org/officeDocument/2006/relationships" xmlns:p="http://schemas.openxmlformats.org/presentationml/2006/main">
-  <p:cSld>
-    <p:spTree>
-      <p:nvGrpSpPr>
-        <p:cNvPr id="1" name=""/>
-        <p:cNvGrpSpPr/>
-        <p:nvPr/>
-      </p:nvGrpSpPr>
-      <p:grpSpPr>
-        <a:xfrm>
-          <a:off x="0" y="0"/>
-          <a:ext cx="0" cy="0"/>
-          <a:chOff x="0" y="0"/>
-          <a:chExt cx="0" cy="0"/>
-        </a:xfrm>
-      </p:grpSpPr>
-      <p:sp>
-        <p:nvSpPr>
-          <p:cNvPr id="2" name="Foliennummernplatzhalter 1">
-            <a:extLst>
-              <a:ext uri="{FF2B5EF4-FFF2-40B4-BE49-F238E27FC236}">
-                <a16:creationId xmlns:a16="http://schemas.microsoft.com/office/drawing/2014/main" id="{0BC5A5AD-9682-566E-A0E7-1FF021B7319B}"/>
-              </a:ext>
-            </a:extLst>
-          </p:cNvPr>
-          <p:cNvSpPr>
-            <a:spLocks noGrp="1"/>
-          </p:cNvSpPr>
-          <p:nvPr>
-            <p:ph type="sldNum" sz="quarter" idx="12"/>
-          </p:nvPr>
-        </p:nvSpPr>
-        <p:spPr/>
-        <p:txBody>
-          <a:bodyPr/>
-          <a:lstStyle/>
-          <a:p>
-            <a:fld id="{3D4C94FE-FF23-4504-88E9-14D481113291}" type="slidenum">
-              <a:rPr lang="en-GB" smtClean="0"/>
-              <a:t>15</a:t>
-            </a:fld>
-            <a:endParaRPr lang="en-GB"/>
-          </a:p>
-        </p:txBody>
-      </p:sp>
-      <p:pic>
-        <p:nvPicPr>
-          <p:cNvPr id="4" name="Grafik 3" descr="Ein Bild, das Text, Screenshot, Zahl, Schrift enthält.&#10;&#10;KI-generierte Inhalte können fehlerhaft sein.">
-            <a:extLst>
-              <a:ext uri="{FF2B5EF4-FFF2-40B4-BE49-F238E27FC236}">
-                <a16:creationId xmlns:a16="http://schemas.microsoft.com/office/drawing/2014/main" id="{2000A6A5-E9A0-2305-24AE-48ABFAD0CDDA}"/>
-              </a:ext>
-            </a:extLst>
-          </p:cNvPr>
-          <p:cNvPicPr>
-            <a:picLocks noChangeAspect="1"/>
-          </p:cNvPicPr>
-          <p:nvPr/>
-        </p:nvPicPr>
-        <p:blipFill>
-          <a:blip r:embed="rId2">
-            <a:extLst>
-              <a:ext uri="{28A0092B-C50C-407E-A947-70E740481C1C}">
-                <a14:useLocalDpi xmlns:a14="http://schemas.microsoft.com/office/drawing/2010/main" val="0"/>
-              </a:ext>
-            </a:extLst>
-          </a:blip>
-          <a:stretch>
-            <a:fillRect/>
-          </a:stretch>
-        </p:blipFill>
-        <p:spPr>
-          <a:xfrm>
-            <a:off x="2918817" y="0"/>
-            <a:ext cx="6354366" cy="6858000"/>
-          </a:xfrm>
-          <a:prstGeom prst="rect">
-            <a:avLst/>
-          </a:prstGeom>
-        </p:spPr>
-      </p:pic>
-      <p:sp>
-        <p:nvSpPr>
-          <p:cNvPr id="5" name="Textfeld 4">
-            <a:extLst>
-              <a:ext uri="{FF2B5EF4-FFF2-40B4-BE49-F238E27FC236}">
-                <a16:creationId xmlns:a16="http://schemas.microsoft.com/office/drawing/2014/main" id="{4992BEDA-AAD0-0BE4-DB45-81FC80BDD380}"/>
-              </a:ext>
-            </a:extLst>
-          </p:cNvPr>
-          <p:cNvSpPr txBox="1"/>
-          <p:nvPr/>
-        </p:nvSpPr>
-        <p:spPr>
-          <a:xfrm>
-            <a:off x="546538" y="2936557"/>
-            <a:ext cx="1457707" cy="492443"/>
-          </a:xfrm>
-          <a:prstGeom prst="rect">
-            <a:avLst/>
-          </a:prstGeom>
-          <a:noFill/>
-        </p:spPr>
-        <p:txBody>
-          <a:bodyPr wrap="none" rtlCol="0">
-            <a:spAutoFit/>
-          </a:bodyPr>
-          <a:lstStyle/>
-          <a:p>
-            <a:r>
-              <a:rPr lang="de-DE" sz="2600" dirty="0" err="1">
-                <a:hlinkClick r:id="rId3"/>
-              </a:rPr>
-              <a:t>LMArena</a:t>
-            </a:r>
-            <a:endParaRPr lang="de-DE" sz="2600" dirty="0"/>
-          </a:p>
-        </p:txBody>
-      </p:sp>
-    </p:spTree>
-    <p:extLst>
-      <p:ext uri="{BB962C8B-B14F-4D97-AF65-F5344CB8AC3E}">
-        <p14:creationId xmlns:p14="http://schemas.microsoft.com/office/powerpoint/2010/main" val="863031342"/>
       </p:ext>
     </p:extLst>
   </p:cSld>
@@ -12520,7 +12667,7 @@
           <p:cNvPr id="2" name="Foliennummernplatzhalter 1">
             <a:extLst>
               <a:ext uri="{FF2B5EF4-FFF2-40B4-BE49-F238E27FC236}">
-                <a16:creationId xmlns:a16="http://schemas.microsoft.com/office/drawing/2014/main" id="{506262BA-AE93-BBE6-3A2D-660FFBAB356F}"/>
+                <a16:creationId xmlns:a16="http://schemas.microsoft.com/office/drawing/2014/main" id="{0BC5A5AD-9682-566E-A0E7-1FF021B7319B}"/>
               </a:ext>
             </a:extLst>
           </p:cNvPr>
@@ -12546,10 +12693,10 @@
       </p:sp>
       <p:pic>
         <p:nvPicPr>
-          <p:cNvPr id="6" name="Grafik 5" descr="Ein Bild, das Screenshot, Diagramm, Text, Reihe enthält.&#10;&#10;KI-generierte Inhalte können fehlerhaft sein.">
+          <p:cNvPr id="4" name="Grafik 3" descr="Ein Bild, das Text, Screenshot, Zahl, Schrift enthält.&#10;&#10;KI-generierte Inhalte können fehlerhaft sein.">
             <a:extLst>
               <a:ext uri="{FF2B5EF4-FFF2-40B4-BE49-F238E27FC236}">
-                <a16:creationId xmlns:a16="http://schemas.microsoft.com/office/drawing/2014/main" id="{ACBBB43E-6D01-0E2C-4F48-8B4027BCEF00}"/>
+                <a16:creationId xmlns:a16="http://schemas.microsoft.com/office/drawing/2014/main" id="{2000A6A5-E9A0-2305-24AE-48ABFAD0CDDA}"/>
               </a:ext>
             </a:extLst>
           </p:cNvPr>
@@ -12572,8 +12719,8 @@
         </p:blipFill>
         <p:spPr>
           <a:xfrm>
-            <a:off x="838200" y="136525"/>
-            <a:ext cx="10444817" cy="6260954"/>
+            <a:off x="2918817" y="0"/>
+            <a:ext cx="6354366" cy="6858000"/>
           </a:xfrm>
           <a:prstGeom prst="rect">
             <a:avLst/>
@@ -12582,10 +12729,10 @@
       </p:pic>
       <p:sp>
         <p:nvSpPr>
-          <p:cNvPr id="7" name="TextBox 6">
+          <p:cNvPr id="5" name="Textfeld 4">
             <a:extLst>
               <a:ext uri="{FF2B5EF4-FFF2-40B4-BE49-F238E27FC236}">
-                <a16:creationId xmlns:a16="http://schemas.microsoft.com/office/drawing/2014/main" id="{0664B754-3B35-012F-F973-FC3151093A90}"/>
+                <a16:creationId xmlns:a16="http://schemas.microsoft.com/office/drawing/2014/main" id="{4992BEDA-AAD0-0BE4-DB45-81FC80BDD380}"/>
               </a:ext>
             </a:extLst>
           </p:cNvPr>
@@ -12594,8 +12741,8 @@
         </p:nvSpPr>
         <p:spPr>
           <a:xfrm>
-            <a:off x="11283017" y="5561450"/>
-            <a:ext cx="567784" cy="246221"/>
+            <a:off x="546538" y="2936557"/>
+            <a:ext cx="1457707" cy="492443"/>
           </a:xfrm>
           <a:prstGeom prst="rect">
             <a:avLst/>
@@ -12609,19 +12756,19 @@
           <a:lstStyle/>
           <a:p>
             <a:r>
-              <a:rPr lang="de-DE" sz="1000" dirty="0">
+              <a:rPr lang="de-DE" sz="2600" dirty="0" err="1">
                 <a:hlinkClick r:id="rId3"/>
               </a:rPr>
-              <a:t>source</a:t>
-            </a:r>
-            <a:endParaRPr lang="de-DE" sz="1000" dirty="0"/>
+              <a:t>LMArena</a:t>
+            </a:r>
+            <a:endParaRPr lang="de-DE" sz="2600" dirty="0"/>
           </a:p>
         </p:txBody>
       </p:sp>
     </p:spTree>
     <p:extLst>
       <p:ext uri="{BB962C8B-B14F-4D97-AF65-F5344CB8AC3E}">
-        <p14:creationId xmlns:p14="http://schemas.microsoft.com/office/powerpoint/2010/main" val="459329488"/>
+        <p14:creationId xmlns:p14="http://schemas.microsoft.com/office/powerpoint/2010/main" val="863031342"/>
       </p:ext>
     </p:extLst>
   </p:cSld>
@@ -12650,6 +12797,139 @@
       </p:grpSpPr>
       <p:sp>
         <p:nvSpPr>
+          <p:cNvPr id="2" name="Foliennummernplatzhalter 1">
+            <a:extLst>
+              <a:ext uri="{FF2B5EF4-FFF2-40B4-BE49-F238E27FC236}">
+                <a16:creationId xmlns:a16="http://schemas.microsoft.com/office/drawing/2014/main" id="{506262BA-AE93-BBE6-3A2D-660FFBAB356F}"/>
+              </a:ext>
+            </a:extLst>
+          </p:cNvPr>
+          <p:cNvSpPr>
+            <a:spLocks noGrp="1"/>
+          </p:cNvSpPr>
+          <p:nvPr>
+            <p:ph type="sldNum" sz="quarter" idx="12"/>
+          </p:nvPr>
+        </p:nvSpPr>
+        <p:spPr/>
+        <p:txBody>
+          <a:bodyPr/>
+          <a:lstStyle/>
+          <a:p>
+            <a:fld id="{3D4C94FE-FF23-4504-88E9-14D481113291}" type="slidenum">
+              <a:rPr lang="en-GB" smtClean="0"/>
+              <a:t>17</a:t>
+            </a:fld>
+            <a:endParaRPr lang="en-GB"/>
+          </a:p>
+        </p:txBody>
+      </p:sp>
+      <p:pic>
+        <p:nvPicPr>
+          <p:cNvPr id="6" name="Grafik 5" descr="Ein Bild, das Screenshot, Diagramm, Text, Reihe enthält.&#10;&#10;KI-generierte Inhalte können fehlerhaft sein.">
+            <a:extLst>
+              <a:ext uri="{FF2B5EF4-FFF2-40B4-BE49-F238E27FC236}">
+                <a16:creationId xmlns:a16="http://schemas.microsoft.com/office/drawing/2014/main" id="{ACBBB43E-6D01-0E2C-4F48-8B4027BCEF00}"/>
+              </a:ext>
+            </a:extLst>
+          </p:cNvPr>
+          <p:cNvPicPr>
+            <a:picLocks noChangeAspect="1"/>
+          </p:cNvPicPr>
+          <p:nvPr/>
+        </p:nvPicPr>
+        <p:blipFill>
+          <a:blip r:embed="rId2">
+            <a:extLst>
+              <a:ext uri="{28A0092B-C50C-407E-A947-70E740481C1C}">
+                <a14:useLocalDpi xmlns:a14="http://schemas.microsoft.com/office/drawing/2010/main" val="0"/>
+              </a:ext>
+            </a:extLst>
+          </a:blip>
+          <a:stretch>
+            <a:fillRect/>
+          </a:stretch>
+        </p:blipFill>
+        <p:spPr>
+          <a:xfrm>
+            <a:off x="838200" y="136525"/>
+            <a:ext cx="10444817" cy="6260954"/>
+          </a:xfrm>
+          <a:prstGeom prst="rect">
+            <a:avLst/>
+          </a:prstGeom>
+        </p:spPr>
+      </p:pic>
+      <p:sp>
+        <p:nvSpPr>
+          <p:cNvPr id="7" name="TextBox 6">
+            <a:extLst>
+              <a:ext uri="{FF2B5EF4-FFF2-40B4-BE49-F238E27FC236}">
+                <a16:creationId xmlns:a16="http://schemas.microsoft.com/office/drawing/2014/main" id="{0664B754-3B35-012F-F973-FC3151093A90}"/>
+              </a:ext>
+            </a:extLst>
+          </p:cNvPr>
+          <p:cNvSpPr txBox="1"/>
+          <p:nvPr/>
+        </p:nvSpPr>
+        <p:spPr>
+          <a:xfrm>
+            <a:off x="11283017" y="5561450"/>
+            <a:ext cx="567784" cy="246221"/>
+          </a:xfrm>
+          <a:prstGeom prst="rect">
+            <a:avLst/>
+          </a:prstGeom>
+          <a:noFill/>
+        </p:spPr>
+        <p:txBody>
+          <a:bodyPr wrap="none" rtlCol="0">
+            <a:spAutoFit/>
+          </a:bodyPr>
+          <a:lstStyle/>
+          <a:p>
+            <a:r>
+              <a:rPr lang="de-DE" sz="1000" dirty="0">
+                <a:hlinkClick r:id="rId3"/>
+              </a:rPr>
+              <a:t>source</a:t>
+            </a:r>
+            <a:endParaRPr lang="de-DE" sz="1000" dirty="0"/>
+          </a:p>
+        </p:txBody>
+      </p:sp>
+    </p:spTree>
+    <p:extLst>
+      <p:ext uri="{BB962C8B-B14F-4D97-AF65-F5344CB8AC3E}">
+        <p14:creationId xmlns:p14="http://schemas.microsoft.com/office/powerpoint/2010/main" val="459329488"/>
+      </p:ext>
+    </p:extLst>
+  </p:cSld>
+  <p:clrMapOvr>
+    <a:masterClrMapping/>
+  </p:clrMapOvr>
+</p:sld>
+</file>
+
+<file path=ppt/slides/slide18.xml><?xml version="1.0" encoding="utf-8"?>
+<p:sld xmlns:a="http://schemas.openxmlformats.org/drawingml/2006/main" xmlns:r="http://schemas.openxmlformats.org/officeDocument/2006/relationships" xmlns:p="http://schemas.openxmlformats.org/presentationml/2006/main">
+  <p:cSld>
+    <p:spTree>
+      <p:nvGrpSpPr>
+        <p:cNvPr id="1" name=""/>
+        <p:cNvGrpSpPr/>
+        <p:nvPr/>
+      </p:nvGrpSpPr>
+      <p:grpSpPr>
+        <a:xfrm>
+          <a:off x="0" y="0"/>
+          <a:ext cx="0" cy="0"/>
+          <a:chOff x="0" y="0"/>
+          <a:chExt cx="0" cy="0"/>
+        </a:xfrm>
+      </p:grpSpPr>
+      <p:sp>
+        <p:nvSpPr>
           <p:cNvPr id="2" name="Title 1">
             <a:extLst>
               <a:ext uri="{FF2B5EF4-FFF2-40B4-BE49-F238E27FC236}">
@@ -12850,7 +13130,7 @@
           <a:p>
             <a:fld id="{849D05A8-43E9-1C49-8606-50AB68220DEC}" type="slidenum">
               <a:rPr lang="en-DE" smtClean="0"/>
-              <a:t>17</a:t>
+              <a:t>18</a:t>
             </a:fld>
             <a:endParaRPr lang="en-DE"/>
           </a:p>
@@ -12869,7 +13149,7 @@
 </p:sld>
 </file>
 
-<file path=ppt/slides/slide18.xml><?xml version="1.0" encoding="utf-8"?>
+<file path=ppt/slides/slide19.xml><?xml version="1.0" encoding="utf-8"?>
 <p:sld xmlns:a="http://schemas.openxmlformats.org/drawingml/2006/main" xmlns:r="http://schemas.openxmlformats.org/officeDocument/2006/relationships" xmlns:p="http://schemas.openxmlformats.org/presentationml/2006/main">
   <p:cSld>
     <p:spTree>
@@ -13279,7 +13559,7 @@
           <a:p>
             <a:fld id="{849D05A8-43E9-1C49-8606-50AB68220DEC}" type="slidenum">
               <a:rPr lang="en-DE" smtClean="0"/>
-              <a:t>18</a:t>
+              <a:t>19</a:t>
             </a:fld>
             <a:endParaRPr lang="en-DE"/>
           </a:p>
@@ -14176,8 +14456,8 @@
           </a:p>
         </p:txBody>
       </p:sp>
-      <mc:AlternateContent xmlns:mc="http://schemas.openxmlformats.org/markup-compatibility/2006" xmlns:a14="http://schemas.microsoft.com/office/drawing/2010/main">
-        <mc:Choice Requires="a14">
+      <mc:AlternateContent xmlns:mc="http://schemas.openxmlformats.org/markup-compatibility/2006">
+        <mc:Choice xmlns:a14="http://schemas.microsoft.com/office/drawing/2010/main" Requires="a14">
           <p:sp>
             <p:nvSpPr>
               <p:cNvPr id="3" name="Content Placeholder 2">
@@ -14196,15 +14476,30 @@
             </p:nvSpPr>
             <p:spPr>
               <a:xfrm>
-                <a:off x="838201" y="1825625"/>
-                <a:ext cx="6193220" cy="4351338"/>
+                <a:off x="596464" y="1825625"/>
+                <a:ext cx="6483753" cy="4351338"/>
               </a:xfrm>
             </p:spPr>
             <p:txBody>
               <a:bodyPr>
-                <a:normAutofit/>
+                <a:normAutofit fontScale="92500" lnSpcReduction="10000"/>
               </a:bodyPr>
               <a:lstStyle/>
+              <a:p>
+                <a:pPr marL="0" indent="0">
+                  <a:buNone/>
+                </a:pPr>
+                <a:r>
+                  <a:rPr lang="en-GB" dirty="0"/>
+                  <a:t>popular use case: machine translation</a:t>
+                </a:r>
+              </a:p>
+              <a:p>
+                <a:pPr marL="0" indent="0">
+                  <a:buNone/>
+                </a:pPr>
+                <a:endParaRPr lang="en-GB" dirty="0"/>
+              </a:p>
               <a:p>
                 <a:pPr marL="0" indent="0">
                   <a:buNone/>
@@ -14302,7 +14597,7 @@
             </p:txBody>
           </p:sp>
         </mc:Choice>
-        <mc:Fallback xmlns="">
+        <mc:Fallback>
           <p:sp>
             <p:nvSpPr>
               <p:cNvPr id="3" name="Content Placeholder 2">
@@ -14321,13 +14616,13 @@
             </p:nvSpPr>
             <p:spPr>
               <a:xfrm>
-                <a:off x="838201" y="1825625"/>
-                <a:ext cx="6193220" cy="4351338"/>
+                <a:off x="596464" y="1825625"/>
+                <a:ext cx="6483753" cy="4351338"/>
               </a:xfrm>
               <a:blipFill>
                 <a:blip r:embed="rId3"/>
                 <a:stretch>
-                  <a:fillRect l="-2049" t="-2326" r="-3279"/>
+                  <a:fillRect l="-1761" t="-2616" r="-587"/>
                 </a:stretch>
               </a:blipFill>
             </p:spPr>
@@ -14878,6 +15173,146 @@
   <p:cSld>
     <p:spTree>
       <p:nvGrpSpPr>
+        <p:cNvPr id="1" name=""/>
+        <p:cNvGrpSpPr/>
+        <p:nvPr/>
+      </p:nvGrpSpPr>
+      <p:grpSpPr>
+        <a:xfrm>
+          <a:off x="0" y="0"/>
+          <a:ext cx="0" cy="0"/>
+          <a:chOff x="0" y="0"/>
+          <a:chExt cx="0" cy="0"/>
+        </a:xfrm>
+      </p:grpSpPr>
+      <p:sp>
+        <p:nvSpPr>
+          <p:cNvPr id="2" name="Titel 1">
+            <a:extLst>
+              <a:ext uri="{FF2B5EF4-FFF2-40B4-BE49-F238E27FC236}">
+                <a16:creationId xmlns:a16="http://schemas.microsoft.com/office/drawing/2014/main" id="{47377014-5C9A-61F9-AEB0-5422FFC74E48}"/>
+              </a:ext>
+            </a:extLst>
+          </p:cNvPr>
+          <p:cNvSpPr>
+            <a:spLocks noGrp="1"/>
+          </p:cNvSpPr>
+          <p:nvPr>
+            <p:ph type="title"/>
+          </p:nvPr>
+        </p:nvSpPr>
+        <p:spPr/>
+        <p:txBody>
+          <a:bodyPr/>
+          <a:lstStyle/>
+          <a:p>
+            <a:r>
+              <a:rPr lang="de-DE" dirty="0"/>
+              <a:t>BERT </a:t>
+            </a:r>
+            <a:r>
+              <a:rPr lang="de-DE" dirty="0" err="1"/>
+              <a:t>Variants</a:t>
+            </a:r>
+            <a:endParaRPr lang="de-DE" dirty="0"/>
+          </a:p>
+        </p:txBody>
+      </p:sp>
+      <p:sp>
+        <p:nvSpPr>
+          <p:cNvPr id="3" name="Inhaltsplatzhalter 2">
+            <a:extLst>
+              <a:ext uri="{FF2B5EF4-FFF2-40B4-BE49-F238E27FC236}">
+                <a16:creationId xmlns:a16="http://schemas.microsoft.com/office/drawing/2014/main" id="{E32E57AC-9AEC-A942-0A0F-644BB5F978B9}"/>
+              </a:ext>
+            </a:extLst>
+          </p:cNvPr>
+          <p:cNvSpPr>
+            <a:spLocks noGrp="1"/>
+          </p:cNvSpPr>
+          <p:nvPr>
+            <p:ph idx="1"/>
+          </p:nvPr>
+        </p:nvSpPr>
+        <p:spPr/>
+        <p:txBody>
+          <a:bodyPr/>
+          <a:lstStyle/>
+          <a:p>
+            <a:r>
+              <a:rPr lang="de-DE" dirty="0" err="1"/>
+              <a:t>RoBERTa</a:t>
+            </a:r>
+            <a:r>
+              <a:rPr lang="de-DE" dirty="0"/>
+              <a:t> …</a:t>
+            </a:r>
+          </a:p>
+          <a:p>
+            <a:pPr marL="0" indent="0">
+              <a:buNone/>
+            </a:pPr>
+            <a:endParaRPr lang="de-DE" dirty="0"/>
+          </a:p>
+          <a:p>
+            <a:r>
+              <a:rPr lang="de-DE" dirty="0" err="1"/>
+              <a:t>DistilBERT</a:t>
+            </a:r>
+            <a:r>
+              <a:rPr lang="de-DE" dirty="0"/>
+              <a:t> …</a:t>
+            </a:r>
+          </a:p>
+        </p:txBody>
+      </p:sp>
+      <p:sp>
+        <p:nvSpPr>
+          <p:cNvPr id="4" name="Foliennummernplatzhalter 3">
+            <a:extLst>
+              <a:ext uri="{FF2B5EF4-FFF2-40B4-BE49-F238E27FC236}">
+                <a16:creationId xmlns:a16="http://schemas.microsoft.com/office/drawing/2014/main" id="{6C9E7DDC-F9E4-F124-BF7B-7A2E77B7C25C}"/>
+              </a:ext>
+            </a:extLst>
+          </p:cNvPr>
+          <p:cNvSpPr>
+            <a:spLocks noGrp="1"/>
+          </p:cNvSpPr>
+          <p:nvPr>
+            <p:ph type="sldNum" sz="quarter" idx="12"/>
+          </p:nvPr>
+        </p:nvSpPr>
+        <p:spPr/>
+        <p:txBody>
+          <a:bodyPr/>
+          <a:lstStyle/>
+          <a:p>
+            <a:fld id="{3D4C94FE-FF23-4504-88E9-14D481113291}" type="slidenum">
+              <a:rPr lang="en-GB" smtClean="0"/>
+              <a:t>7</a:t>
+            </a:fld>
+            <a:endParaRPr lang="en-GB"/>
+          </a:p>
+        </p:txBody>
+      </p:sp>
+    </p:spTree>
+    <p:extLst>
+      <p:ext uri="{BB962C8B-B14F-4D97-AF65-F5344CB8AC3E}">
+        <p14:creationId xmlns:p14="http://schemas.microsoft.com/office/powerpoint/2010/main" val="3675046636"/>
+      </p:ext>
+    </p:extLst>
+  </p:cSld>
+  <p:clrMapOvr>
+    <a:masterClrMapping/>
+  </p:clrMapOvr>
+</p:sld>
+</file>
+
+<file path=ppt/slides/slide8.xml><?xml version="1.0" encoding="utf-8"?>
+<p:sld xmlns:a="http://schemas.openxmlformats.org/drawingml/2006/main" xmlns:r="http://schemas.openxmlformats.org/officeDocument/2006/relationships" xmlns:p="http://schemas.openxmlformats.org/presentationml/2006/main">
+  <p:cSld>
+    <p:spTree>
+      <p:nvGrpSpPr>
         <p:cNvPr id="1" name="">
           <a:extLst>
             <a:ext uri="{FF2B5EF4-FFF2-40B4-BE49-F238E27FC236}">
@@ -15092,7 +15527,7 @@
           <a:p>
             <a:fld id="{849D05A8-43E9-1C49-8606-50AB68220DEC}" type="slidenum">
               <a:rPr lang="en-DE" smtClean="0"/>
-              <a:t>7</a:t>
+              <a:t>8</a:t>
             </a:fld>
             <a:endParaRPr lang="en-DE"/>
           </a:p>
@@ -15176,250 +15611,6 @@
     <p:extLst>
       <p:ext uri="{BB962C8B-B14F-4D97-AF65-F5344CB8AC3E}">
         <p14:creationId xmlns:p14="http://schemas.microsoft.com/office/powerpoint/2010/main" val="1286678673"/>
-      </p:ext>
-    </p:extLst>
-  </p:cSld>
-  <p:clrMapOvr>
-    <a:masterClrMapping/>
-  </p:clrMapOvr>
-</p:sld>
-</file>
-
-<file path=ppt/slides/slide8.xml><?xml version="1.0" encoding="utf-8"?>
-<p:sld xmlns:a="http://schemas.openxmlformats.org/drawingml/2006/main" xmlns:r="http://schemas.openxmlformats.org/officeDocument/2006/relationships" xmlns:p="http://schemas.openxmlformats.org/presentationml/2006/main">
-  <p:cSld>
-    <p:spTree>
-      <p:nvGrpSpPr>
-        <p:cNvPr id="1" name=""/>
-        <p:cNvGrpSpPr/>
-        <p:nvPr/>
-      </p:nvGrpSpPr>
-      <p:grpSpPr>
-        <a:xfrm>
-          <a:off x="0" y="0"/>
-          <a:ext cx="0" cy="0"/>
-          <a:chOff x="0" y="0"/>
-          <a:chExt cx="0" cy="0"/>
-        </a:xfrm>
-      </p:grpSpPr>
-      <p:sp>
-        <p:nvSpPr>
-          <p:cNvPr id="2" name="Title 1">
-            <a:extLst>
-              <a:ext uri="{FF2B5EF4-FFF2-40B4-BE49-F238E27FC236}">
-                <a16:creationId xmlns:a16="http://schemas.microsoft.com/office/drawing/2014/main" id="{F4B34BCA-6F2E-E1E0-5E78-C602E733CA5E}"/>
-              </a:ext>
-            </a:extLst>
-          </p:cNvPr>
-          <p:cNvSpPr>
-            <a:spLocks noGrp="1"/>
-          </p:cNvSpPr>
-          <p:nvPr>
-            <p:ph type="title"/>
-          </p:nvPr>
-        </p:nvSpPr>
-        <p:spPr/>
-        <p:txBody>
-          <a:bodyPr/>
-          <a:lstStyle/>
-          <a:p>
-            <a:r>
-              <a:rPr lang="de-DE" dirty="0"/>
-              <a:t>GPT Evolution</a:t>
-            </a:r>
-            <a:endParaRPr lang="en-DE" dirty="0"/>
-          </a:p>
-        </p:txBody>
-      </p:sp>
-      <p:sp>
-        <p:nvSpPr>
-          <p:cNvPr id="3" name="Content Placeholder 2">
-            <a:extLst>
-              <a:ext uri="{FF2B5EF4-FFF2-40B4-BE49-F238E27FC236}">
-                <a16:creationId xmlns:a16="http://schemas.microsoft.com/office/drawing/2014/main" id="{D878DA15-F9B0-18B3-B458-752CD40FD84B}"/>
-              </a:ext>
-            </a:extLst>
-          </p:cNvPr>
-          <p:cNvSpPr>
-            <a:spLocks noGrp="1"/>
-          </p:cNvSpPr>
-          <p:nvPr>
-            <p:ph idx="1"/>
-          </p:nvPr>
-        </p:nvSpPr>
-        <p:spPr>
-          <a:xfrm>
-            <a:off x="838200" y="1817159"/>
-            <a:ext cx="10515600" cy="4351338"/>
-          </a:xfrm>
-        </p:spPr>
-        <p:txBody>
-          <a:bodyPr>
-            <a:normAutofit/>
-          </a:bodyPr>
-          <a:lstStyle/>
-          <a:p>
-            <a:pPr marL="0" indent="0">
-              <a:buNone/>
-            </a:pPr>
-            <a:r>
-              <a:rPr lang="en-DE" sz="2600">
-                <a:hlinkClick r:id="rId2"/>
-              </a:rPr>
-              <a:t>GPT</a:t>
-            </a:r>
-            <a:r>
-              <a:rPr lang="en-DE" sz="2600" dirty="0"/>
-              <a:t>: discriminative fine-tuning on specific tasks (e.g., summarization, translation, question-answering) with much smaller </a:t>
-            </a:r>
-            <a:r>
-              <a:rPr lang="en-DE" sz="2600"/>
-              <a:t>data sets</a:t>
-            </a:r>
-            <a:endParaRPr lang="de-DE" sz="2600" dirty="0"/>
-          </a:p>
-          <a:p>
-            <a:pPr marL="0" indent="0">
-              <a:buNone/>
-            </a:pPr>
-            <a:endParaRPr lang="en-DE" sz="2600" dirty="0"/>
-          </a:p>
-          <a:p>
-            <a:pPr marL="0" indent="0">
-              <a:buNone/>
-            </a:pPr>
-            <a:r>
-              <a:rPr lang="en-GB" sz="2600" dirty="0">
-                <a:hlinkClick r:id="rId3"/>
-              </a:rPr>
-              <a:t>GPT-2</a:t>
-            </a:r>
-            <a:r>
-              <a:rPr lang="en-GB" sz="2600" dirty="0"/>
-              <a:t>, </a:t>
-            </a:r>
-            <a:r>
-              <a:rPr lang="en-GB" sz="2600" dirty="0">
-                <a:hlinkClick r:id="rId4"/>
-              </a:rPr>
-              <a:t>GPT-3</a:t>
-            </a:r>
-            <a:r>
-              <a:rPr lang="en-GB" sz="2600" dirty="0"/>
-              <a:t> (</a:t>
-            </a:r>
-            <a:r>
-              <a:rPr lang="en-DE" sz="2600" dirty="0"/>
-              <a:t>175 billion parameters</a:t>
-            </a:r>
-            <a:r>
-              <a:rPr lang="en-GB" sz="2600" dirty="0"/>
-              <a:t>)</a:t>
-            </a:r>
-            <a:r>
-              <a:rPr lang="en-DE" sz="2600" dirty="0"/>
-              <a:t>: also zero- or </a:t>
-            </a:r>
-            <a:r>
-              <a:rPr lang="en-DE" sz="2600"/>
-              <a:t>few-shot learning</a:t>
-            </a:r>
-            <a:endParaRPr lang="de-DE" sz="2600" dirty="0"/>
-          </a:p>
-          <a:p>
-            <a:pPr marL="0" indent="0">
-              <a:buNone/>
-            </a:pPr>
-            <a:endParaRPr lang="en-DE" sz="2600" dirty="0"/>
-          </a:p>
-          <a:p>
-            <a:pPr marL="0" indent="0">
-              <a:buNone/>
-            </a:pPr>
-            <a:r>
-              <a:rPr lang="en-GB" sz="2600" dirty="0">
-                <a:hlinkClick r:id="rId5"/>
-              </a:rPr>
-              <a:t>GPT-4</a:t>
-            </a:r>
-            <a:r>
-              <a:rPr lang="en-DE" sz="2600" dirty="0"/>
-              <a:t>: extend to multimodal model (image and text inputs, text outputs)</a:t>
-            </a:r>
-          </a:p>
-        </p:txBody>
-      </p:sp>
-      <p:sp>
-        <p:nvSpPr>
-          <p:cNvPr id="4" name="Slide Number Placeholder 3">
-            <a:extLst>
-              <a:ext uri="{FF2B5EF4-FFF2-40B4-BE49-F238E27FC236}">
-                <a16:creationId xmlns:a16="http://schemas.microsoft.com/office/drawing/2014/main" id="{1C62DF1F-CE76-8FAE-EDB4-4B22AB609EFE}"/>
-              </a:ext>
-            </a:extLst>
-          </p:cNvPr>
-          <p:cNvSpPr>
-            <a:spLocks noGrp="1"/>
-          </p:cNvSpPr>
-          <p:nvPr>
-            <p:ph type="sldNum" sz="quarter" idx="12"/>
-          </p:nvPr>
-        </p:nvSpPr>
-        <p:spPr/>
-        <p:txBody>
-          <a:bodyPr/>
-          <a:lstStyle/>
-          <a:p>
-            <a:fld id="{849D05A8-43E9-1C49-8606-50AB68220DEC}" type="slidenum">
-              <a:rPr lang="en-DE" smtClean="0"/>
-              <a:t>8</a:t>
-            </a:fld>
-            <a:endParaRPr lang="en-DE"/>
-          </a:p>
-        </p:txBody>
-      </p:sp>
-      <p:sp>
-        <p:nvSpPr>
-          <p:cNvPr id="5" name="TextBox 4">
-            <a:extLst>
-              <a:ext uri="{FF2B5EF4-FFF2-40B4-BE49-F238E27FC236}">
-                <a16:creationId xmlns:a16="http://schemas.microsoft.com/office/drawing/2014/main" id="{C37A9C10-65EB-EB41-C373-8724DC38C102}"/>
-              </a:ext>
-            </a:extLst>
-          </p:cNvPr>
-          <p:cNvSpPr txBox="1"/>
-          <p:nvPr/>
-        </p:nvSpPr>
-        <p:spPr>
-          <a:xfrm>
-            <a:off x="838200" y="4581843"/>
-            <a:ext cx="1239122" cy="369332"/>
-          </a:xfrm>
-          <a:prstGeom prst="rect">
-            <a:avLst/>
-          </a:prstGeom>
-          <a:noFill/>
-        </p:spPr>
-        <p:txBody>
-          <a:bodyPr wrap="none" rtlCol="0">
-            <a:spAutoFit/>
-          </a:bodyPr>
-          <a:lstStyle/>
-          <a:p>
-            <a:r>
-              <a:rPr lang="en-DE" dirty="0">
-                <a:hlinkClick r:id="rId6"/>
-              </a:rPr>
-              <a:t>capabilities</a:t>
-            </a:r>
-            <a:endParaRPr lang="en-DE" dirty="0"/>
-          </a:p>
-        </p:txBody>
-      </p:sp>
-    </p:spTree>
-    <p:extLst>
-      <p:ext uri="{BB962C8B-B14F-4D97-AF65-F5344CB8AC3E}">
-        <p14:creationId xmlns:p14="http://schemas.microsoft.com/office/powerpoint/2010/main" val="2356046642"/>
       </p:ext>
     </p:extLst>
   </p:cSld>
@@ -15451,7 +15642,7 @@
           <p:cNvPr id="2" name="Title 1">
             <a:extLst>
               <a:ext uri="{FF2B5EF4-FFF2-40B4-BE49-F238E27FC236}">
-                <a16:creationId xmlns:a16="http://schemas.microsoft.com/office/drawing/2014/main" id="{F89B18D8-662F-8E62-9266-15406EC258A0}"/>
+                <a16:creationId xmlns:a16="http://schemas.microsoft.com/office/drawing/2014/main" id="{F4B34BCA-6F2E-E1E0-5E78-C602E733CA5E}"/>
               </a:ext>
             </a:extLst>
           </p:cNvPr>
@@ -15468,20 +15659,8 @@
           <a:lstStyle/>
           <a:p>
             <a:r>
-              <a:rPr lang="en-DE" dirty="0"/>
-              <a:t>Size Matters</a:t>
-            </a:r>
-            <a:r>
-              <a:rPr lang="en-GB" dirty="0"/>
-              <a:t>: </a:t>
-            </a:r>
-            <a:r>
-              <a:rPr lang="en-GB" b="1" dirty="0"/>
-              <a:t>LARGE</a:t>
-            </a:r>
-            <a:r>
-              <a:rPr lang="en-GB" dirty="0"/>
-              <a:t> Language Models</a:t>
+              <a:rPr lang="de-DE" dirty="0"/>
+              <a:t>GPT Evolution</a:t>
             </a:r>
             <a:endParaRPr lang="en-DE" dirty="0"/>
           </a:p>
@@ -15492,7 +15671,7 @@
           <p:cNvPr id="3" name="Content Placeholder 2">
             <a:extLst>
               <a:ext uri="{FF2B5EF4-FFF2-40B4-BE49-F238E27FC236}">
-                <a16:creationId xmlns:a16="http://schemas.microsoft.com/office/drawing/2014/main" id="{8E0F4078-2FDF-FC34-76CD-ACB22B47969E}"/>
+                <a16:creationId xmlns:a16="http://schemas.microsoft.com/office/drawing/2014/main" id="{D878DA15-F9B0-18B3-B458-752CD40FD84B}"/>
               </a:ext>
             </a:extLst>
           </p:cNvPr>
@@ -15505,8 +15684,8 @@
         </p:nvSpPr>
         <p:spPr>
           <a:xfrm>
-            <a:off x="838198" y="1825625"/>
-            <a:ext cx="8936197" cy="4351338"/>
+            <a:off x="838200" y="1817159"/>
+            <a:ext cx="10515600" cy="4351338"/>
           </a:xfrm>
         </p:spPr>
         <p:txBody>
@@ -15519,82 +15698,89 @@
               <a:buNone/>
             </a:pPr>
             <a:r>
-              <a:rPr lang="en-GB" sz="2600" dirty="0">
+              <a:rPr lang="en-DE" sz="2600">
                 <a:hlinkClick r:id="rId2"/>
               </a:rPr>
-              <a:t>scaling laws</a:t>
-            </a:r>
-            <a:r>
-              <a:rPr lang="en-GB" sz="2600" dirty="0"/>
-              <a:t>, </a:t>
-            </a:r>
+              <a:t>GPT</a:t>
+            </a:r>
+            <a:r>
+              <a:rPr lang="en-DE" sz="2600" dirty="0"/>
+              <a:t>: discriminative fine-tuning on specific tasks (e.g., summarization, translation, question-answering) with much smaller </a:t>
+            </a:r>
+            <a:r>
+              <a:rPr lang="en-DE" sz="2600"/>
+              <a:t>data sets</a:t>
+            </a:r>
+            <a:endParaRPr lang="de-DE" sz="2600" dirty="0"/>
+          </a:p>
+          <a:p>
+            <a:pPr marL="0" indent="0">
+              <a:buNone/>
+            </a:pPr>
+            <a:endParaRPr lang="en-DE" sz="2600" dirty="0"/>
+          </a:p>
+          <a:p>
+            <a:pPr marL="0" indent="0">
+              <a:buNone/>
+            </a:pPr>
             <a:r>
               <a:rPr lang="en-GB" sz="2600" dirty="0">
                 <a:hlinkClick r:id="rId3"/>
               </a:rPr>
-              <a:t>Chinchilla</a:t>
+              <a:t>GPT-2</a:t>
             </a:r>
             <a:r>
               <a:rPr lang="en-GB" sz="2600" dirty="0"/>
-              <a:t>: coupled performance power laws with model size, amount of training data, and compute</a:t>
-            </a:r>
+              <a:t>, </a:t>
+            </a:r>
+            <a:r>
+              <a:rPr lang="en-GB" sz="2600" dirty="0">
+                <a:hlinkClick r:id="rId4"/>
+              </a:rPr>
+              <a:t>GPT-3</a:t>
+            </a:r>
+            <a:r>
+              <a:rPr lang="en-GB" sz="2600" dirty="0"/>
+              <a:t> (</a:t>
+            </a:r>
+            <a:r>
+              <a:rPr lang="en-DE" sz="2600" dirty="0"/>
+              <a:t>175 billion parameters</a:t>
+            </a:r>
+            <a:r>
+              <a:rPr lang="en-GB" sz="2600" dirty="0"/>
+              <a:t>)</a:t>
+            </a:r>
+            <a:r>
+              <a:rPr lang="en-DE" sz="2600" dirty="0"/>
+              <a:t>: also zero- or </a:t>
+            </a:r>
+            <a:r>
+              <a:rPr lang="en-DE" sz="2600"/>
+              <a:t>few-shot learning</a:t>
+            </a:r>
+            <a:endParaRPr lang="de-DE" sz="2600" dirty="0"/>
           </a:p>
           <a:p>
             <a:pPr marL="0" indent="0">
               <a:buNone/>
             </a:pPr>
-            <a:r>
-              <a:rPr lang="en-GB" sz="2600" dirty="0">
-                <a:sym typeface="Wingdings" panose="05000000000000000000" pitchFamily="2" charset="2"/>
-              </a:rPr>
-              <a:t> </a:t>
-            </a:r>
-            <a:r>
-              <a:rPr lang="en-GB" sz="2600" dirty="0"/>
-              <a:t>era of large-scale models</a:t>
-            </a:r>
+            <a:endParaRPr lang="en-DE" sz="2600" dirty="0"/>
           </a:p>
           <a:p>
             <a:pPr marL="0" indent="0">
               <a:buNone/>
             </a:pPr>
-            <a:endParaRPr lang="en-GB" sz="2600" dirty="0"/>
-          </a:p>
-          <a:p>
-            <a:pPr marL="0" indent="0">
-              <a:buNone/>
-            </a:pPr>
-            <a:r>
-              <a:rPr lang="en-GB" sz="2600" dirty="0"/>
-              <a:t>emergent abilities of LLMs:</a:t>
-            </a:r>
-          </a:p>
-          <a:p>
-            <a:r>
-              <a:rPr lang="en-GB" sz="2600" dirty="0"/>
-              <a:t>multi-task learning: perform new tasks at test time without task-specific training (via </a:t>
-            </a:r>
             <a:r>
               <a:rPr lang="en-GB" sz="2600" dirty="0">
-                <a:sym typeface="Wingdings" pitchFamily="2" charset="2"/>
+                <a:hlinkClick r:id="rId5"/>
               </a:rPr>
-              <a:t>p</a:t>
-            </a:r>
-            <a:r>
-              <a:rPr lang="en-GB" sz="2600" dirty="0"/>
-              <a:t>rompting)</a:t>
-            </a:r>
-          </a:p>
-          <a:p>
-            <a:r>
-              <a:rPr lang="en-GB" sz="2600" dirty="0">
-                <a:solidFill>
-                  <a:srgbClr val="212529"/>
-                </a:solidFill>
-              </a:rPr>
-              <a:t>reasoning capabilities</a:t>
-            </a:r>
-            <a:endParaRPr lang="en-GB" sz="2600" dirty="0"/>
+              <a:t>GPT-4</a:t>
+            </a:r>
+            <a:r>
+              <a:rPr lang="en-DE" sz="2600" dirty="0"/>
+              <a:t>: extend to multimodal model (image and text inputs, text outputs)</a:t>
+            </a:r>
           </a:p>
         </p:txBody>
       </p:sp>
@@ -15603,7 +15789,7 @@
           <p:cNvPr id="4" name="Slide Number Placeholder 3">
             <a:extLst>
               <a:ext uri="{FF2B5EF4-FFF2-40B4-BE49-F238E27FC236}">
-                <a16:creationId xmlns:a16="http://schemas.microsoft.com/office/drawing/2014/main" id="{649F0045-E4C4-0C38-5A9B-7A5BA0214CE7}"/>
+                <a16:creationId xmlns:a16="http://schemas.microsoft.com/office/drawing/2014/main" id="{1C62DF1F-CE76-8FAE-EDB4-4B22AB609EFE}"/>
               </a:ext>
             </a:extLst>
           </p:cNvPr>
@@ -15627,42 +15813,12 @@
           </a:p>
         </p:txBody>
       </p:sp>
-      <p:pic>
-        <p:nvPicPr>
-          <p:cNvPr id="6" name="Picture 5">
-            <a:extLst>
-              <a:ext uri="{FF2B5EF4-FFF2-40B4-BE49-F238E27FC236}">
-                <a16:creationId xmlns:a16="http://schemas.microsoft.com/office/drawing/2014/main" id="{B671ACDA-58DE-C671-C490-9A25C570A67D}"/>
-              </a:ext>
-            </a:extLst>
-          </p:cNvPr>
-          <p:cNvPicPr>
-            <a:picLocks noChangeAspect="1"/>
-          </p:cNvPicPr>
-          <p:nvPr/>
-        </p:nvPicPr>
-        <p:blipFill>
-          <a:blip r:embed="rId4"/>
-          <a:stretch>
-            <a:fillRect/>
-          </a:stretch>
-        </p:blipFill>
-        <p:spPr>
-          <a:xfrm>
-            <a:off x="9774395" y="1005021"/>
-            <a:ext cx="2390243" cy="5344539"/>
-          </a:xfrm>
-          <a:prstGeom prst="rect">
-            <a:avLst/>
-          </a:prstGeom>
-        </p:spPr>
-      </p:pic>
       <p:sp>
         <p:nvSpPr>
-          <p:cNvPr id="7" name="TextBox 6">
+          <p:cNvPr id="5" name="TextBox 4">
             <a:extLst>
               <a:ext uri="{FF2B5EF4-FFF2-40B4-BE49-F238E27FC236}">
-                <a16:creationId xmlns:a16="http://schemas.microsoft.com/office/drawing/2014/main" id="{0467208A-C2CD-8126-638D-2517BFC96589}"/>
+                <a16:creationId xmlns:a16="http://schemas.microsoft.com/office/drawing/2014/main" id="{C37A9C10-65EB-EB41-C373-8724DC38C102}"/>
               </a:ext>
             </a:extLst>
           </p:cNvPr>
@@ -15671,8 +15827,8 @@
         </p:nvSpPr>
         <p:spPr>
           <a:xfrm>
-            <a:off x="11632120" y="6349560"/>
-            <a:ext cx="532518" cy="246221"/>
+            <a:off x="838200" y="4581843"/>
+            <a:ext cx="1239122" cy="369332"/>
           </a:xfrm>
           <a:prstGeom prst="rect">
             <a:avLst/>
@@ -15686,19 +15842,19 @@
           <a:lstStyle/>
           <a:p>
             <a:r>
-              <a:rPr lang="de-DE" sz="1000" dirty="0">
-                <a:hlinkClick r:id="rId5"/>
+              <a:rPr lang="en-DE" dirty="0">
+                <a:hlinkClick r:id="rId6"/>
               </a:rPr>
-              <a:t>source</a:t>
-            </a:r>
-            <a:endParaRPr lang="de-DE" sz="1000" dirty="0"/>
+              <a:t>capabilities</a:t>
+            </a:r>
+            <a:endParaRPr lang="en-DE" dirty="0"/>
           </a:p>
         </p:txBody>
       </p:sp>
     </p:spTree>
     <p:extLst>
       <p:ext uri="{BB962C8B-B14F-4D97-AF65-F5344CB8AC3E}">
-        <p14:creationId xmlns:p14="http://schemas.microsoft.com/office/powerpoint/2010/main" val="839114839"/>
+        <p14:creationId xmlns:p14="http://schemas.microsoft.com/office/powerpoint/2010/main" val="2356046642"/>
       </p:ext>
     </p:extLst>
   </p:cSld>

</xml_diff>